<commit_message>
updated server client image
</commit_message>
<xml_diff>
--- a/static/images/docs/about/software_used.pptx
+++ b/static/images/docs/about/software_used.pptx
@@ -105,6 +105,11 @@
       </a:defRPr>
     </a:lvl9pPr>
   </p:defaultTextStyle>
+  <p:extLst>
+    <p:ext uri="{EFAFB233-063F-42B5-8137-9DF3F51BA10A}">
+      <p15:sldGuideLst xmlns:p15="http://schemas.microsoft.com/office/powerpoint/2012/main"/>
+    </p:ext>
+  </p:extLst>
 </p:presentation>
 </file>
 
@@ -239,7 +244,7 @@
           <a:p>
             <a:fld id="{86D32A1E-5D4D-44BA-9F1A-EA6D0544E0E2}" type="datetimeFigureOut">
               <a:rPr lang="en-US" smtClean="0"/>
-              <a:t>4/21/2021</a:t>
+              <a:t>8/6/2022</a:t>
             </a:fld>
             <a:endParaRPr lang="en-US"/>
           </a:p>
@@ -409,7 +414,7 @@
           <a:p>
             <a:fld id="{86D32A1E-5D4D-44BA-9F1A-EA6D0544E0E2}" type="datetimeFigureOut">
               <a:rPr lang="en-US" smtClean="0"/>
-              <a:t>4/21/2021</a:t>
+              <a:t>8/6/2022</a:t>
             </a:fld>
             <a:endParaRPr lang="en-US"/>
           </a:p>
@@ -589,7 +594,7 @@
           <a:p>
             <a:fld id="{86D32A1E-5D4D-44BA-9F1A-EA6D0544E0E2}" type="datetimeFigureOut">
               <a:rPr lang="en-US" smtClean="0"/>
-              <a:t>4/21/2021</a:t>
+              <a:t>8/6/2022</a:t>
             </a:fld>
             <a:endParaRPr lang="en-US"/>
           </a:p>
@@ -759,7 +764,7 @@
           <a:p>
             <a:fld id="{86D32A1E-5D4D-44BA-9F1A-EA6D0544E0E2}" type="datetimeFigureOut">
               <a:rPr lang="en-US" smtClean="0"/>
-              <a:t>4/21/2021</a:t>
+              <a:t>8/6/2022</a:t>
             </a:fld>
             <a:endParaRPr lang="en-US"/>
           </a:p>
@@ -1005,7 +1010,7 @@
           <a:p>
             <a:fld id="{86D32A1E-5D4D-44BA-9F1A-EA6D0544E0E2}" type="datetimeFigureOut">
               <a:rPr lang="en-US" smtClean="0"/>
-              <a:t>4/21/2021</a:t>
+              <a:t>8/6/2022</a:t>
             </a:fld>
             <a:endParaRPr lang="en-US"/>
           </a:p>
@@ -1237,7 +1242,7 @@
           <a:p>
             <a:fld id="{86D32A1E-5D4D-44BA-9F1A-EA6D0544E0E2}" type="datetimeFigureOut">
               <a:rPr lang="en-US" smtClean="0"/>
-              <a:t>4/21/2021</a:t>
+              <a:t>8/6/2022</a:t>
             </a:fld>
             <a:endParaRPr lang="en-US"/>
           </a:p>
@@ -1604,7 +1609,7 @@
           <a:p>
             <a:fld id="{86D32A1E-5D4D-44BA-9F1A-EA6D0544E0E2}" type="datetimeFigureOut">
               <a:rPr lang="en-US" smtClean="0"/>
-              <a:t>4/21/2021</a:t>
+              <a:t>8/6/2022</a:t>
             </a:fld>
             <a:endParaRPr lang="en-US"/>
           </a:p>
@@ -1722,7 +1727,7 @@
           <a:p>
             <a:fld id="{86D32A1E-5D4D-44BA-9F1A-EA6D0544E0E2}" type="datetimeFigureOut">
               <a:rPr lang="en-US" smtClean="0"/>
-              <a:t>4/21/2021</a:t>
+              <a:t>8/6/2022</a:t>
             </a:fld>
             <a:endParaRPr lang="en-US"/>
           </a:p>
@@ -1817,7 +1822,7 @@
           <a:p>
             <a:fld id="{86D32A1E-5D4D-44BA-9F1A-EA6D0544E0E2}" type="datetimeFigureOut">
               <a:rPr lang="en-US" smtClean="0"/>
-              <a:t>4/21/2021</a:t>
+              <a:t>8/6/2022</a:t>
             </a:fld>
             <a:endParaRPr lang="en-US"/>
           </a:p>
@@ -2094,7 +2099,7 @@
           <a:p>
             <a:fld id="{86D32A1E-5D4D-44BA-9F1A-EA6D0544E0E2}" type="datetimeFigureOut">
               <a:rPr lang="en-US" smtClean="0"/>
-              <a:t>4/21/2021</a:t>
+              <a:t>8/6/2022</a:t>
             </a:fld>
             <a:endParaRPr lang="en-US"/>
           </a:p>
@@ -2347,7 +2352,7 @@
           <a:p>
             <a:fld id="{86D32A1E-5D4D-44BA-9F1A-EA6D0544E0E2}" type="datetimeFigureOut">
               <a:rPr lang="en-US" smtClean="0"/>
-              <a:t>4/21/2021</a:t>
+              <a:t>8/6/2022</a:t>
             </a:fld>
             <a:endParaRPr lang="en-US"/>
           </a:p>
@@ -2560,7 +2565,7 @@
           <a:p>
             <a:fld id="{86D32A1E-5D4D-44BA-9F1A-EA6D0544E0E2}" type="datetimeFigureOut">
               <a:rPr lang="en-US" smtClean="0"/>
-              <a:t>4/21/2021</a:t>
+              <a:t>8/6/2022</a:t>
             </a:fld>
             <a:endParaRPr lang="en-US"/>
           </a:p>
@@ -3272,47 +3277,183 @@
       </p:grpSpPr>
       <p:sp>
         <p:nvSpPr>
-          <p:cNvPr id="17" name="Zylinder 16"/>
+          <p:cNvPr id="56" name="Zylinder 55">
+            <a:extLst>
+              <a:ext uri="{FF2B5EF4-FFF2-40B4-BE49-F238E27FC236}">
+                <a16:creationId xmlns:a16="http://schemas.microsoft.com/office/drawing/2014/main" id="{5A1D4164-CA45-4146-84D2-6D40D8073D81}"/>
+              </a:ext>
+            </a:extLst>
+          </p:cNvPr>
           <p:cNvSpPr/>
           <p:nvPr/>
         </p:nvSpPr>
         <p:spPr>
           <a:xfrm>
-            <a:off x="9198755" y="2147186"/>
+            <a:off x="8941802" y="2466163"/>
             <a:ext cx="2324815" cy="2708117"/>
           </a:xfrm>
           <a:prstGeom prst="can">
             <a:avLst/>
           </a:prstGeom>
+          <a:solidFill>
+            <a:srgbClr val="2BB381"/>
+          </a:solidFill>
+          <a:ln w="12700" cap="flat" cmpd="sng" algn="ctr">
+            <a:solidFill>
+              <a:srgbClr val="2BB381"/>
+            </a:solidFill>
+            <a:prstDash val="solid"/>
+            <a:miter lim="800000"/>
+          </a:ln>
+          <a:effectLst>
+            <a:outerShdw blurRad="50800" dist="38100" dir="2700000" algn="tl" rotWithShape="0">
+              <a:prstClr val="black">
+                <a:alpha val="40000"/>
+              </a:prstClr>
+            </a:outerShdw>
+          </a:effectLst>
         </p:spPr>
-        <p:style>
-          <a:lnRef idx="2">
-            <a:schemeClr val="accent1">
-              <a:shade val="50000"/>
-            </a:schemeClr>
-          </a:lnRef>
-          <a:fillRef idx="1">
-            <a:schemeClr val="accent1"/>
-          </a:fillRef>
-          <a:effectRef idx="0">
-            <a:schemeClr val="accent1"/>
-          </a:effectRef>
-          <a:fontRef idx="minor">
-            <a:schemeClr val="lt1"/>
-          </a:fontRef>
-        </p:style>
         <p:txBody>
           <a:bodyPr rtlCol="0" anchor="ctr"/>
-          <a:lstStyle/>
-          <a:p>
-            <a:pPr algn="ctr"/>
-            <a:endParaRPr lang="en-US"/>
+          <a:lstStyle>
+            <a:defPPr>
+              <a:defRPr lang="en-US"/>
+            </a:defPPr>
+            <a:lvl1pPr marL="0" algn="l" defTabSz="914400" rtl="0" eaLnBrk="1" latinLnBrk="0" hangingPunct="1">
+              <a:defRPr sz="1800" kern="1200">
+                <a:solidFill>
+                  <a:schemeClr val="lt1"/>
+                </a:solidFill>
+                <a:latin typeface="+mn-lt"/>
+                <a:ea typeface="+mn-ea"/>
+                <a:cs typeface="+mn-cs"/>
+              </a:defRPr>
+            </a:lvl1pPr>
+            <a:lvl2pPr marL="457200" algn="l" defTabSz="914400" rtl="0" eaLnBrk="1" latinLnBrk="0" hangingPunct="1">
+              <a:defRPr sz="1800" kern="1200">
+                <a:solidFill>
+                  <a:schemeClr val="lt1"/>
+                </a:solidFill>
+                <a:latin typeface="+mn-lt"/>
+                <a:ea typeface="+mn-ea"/>
+                <a:cs typeface="+mn-cs"/>
+              </a:defRPr>
+            </a:lvl2pPr>
+            <a:lvl3pPr marL="914400" algn="l" defTabSz="914400" rtl="0" eaLnBrk="1" latinLnBrk="0" hangingPunct="1">
+              <a:defRPr sz="1800" kern="1200">
+                <a:solidFill>
+                  <a:schemeClr val="lt1"/>
+                </a:solidFill>
+                <a:latin typeface="+mn-lt"/>
+                <a:ea typeface="+mn-ea"/>
+                <a:cs typeface="+mn-cs"/>
+              </a:defRPr>
+            </a:lvl3pPr>
+            <a:lvl4pPr marL="1371600" algn="l" defTabSz="914400" rtl="0" eaLnBrk="1" latinLnBrk="0" hangingPunct="1">
+              <a:defRPr sz="1800" kern="1200">
+                <a:solidFill>
+                  <a:schemeClr val="lt1"/>
+                </a:solidFill>
+                <a:latin typeface="+mn-lt"/>
+                <a:ea typeface="+mn-ea"/>
+                <a:cs typeface="+mn-cs"/>
+              </a:defRPr>
+            </a:lvl4pPr>
+            <a:lvl5pPr marL="1828800" algn="l" defTabSz="914400" rtl="0" eaLnBrk="1" latinLnBrk="0" hangingPunct="1">
+              <a:defRPr sz="1800" kern="1200">
+                <a:solidFill>
+                  <a:schemeClr val="lt1"/>
+                </a:solidFill>
+                <a:latin typeface="+mn-lt"/>
+                <a:ea typeface="+mn-ea"/>
+                <a:cs typeface="+mn-cs"/>
+              </a:defRPr>
+            </a:lvl5pPr>
+            <a:lvl6pPr marL="2286000" algn="l" defTabSz="914400" rtl="0" eaLnBrk="1" latinLnBrk="0" hangingPunct="1">
+              <a:defRPr sz="1800" kern="1200">
+                <a:solidFill>
+                  <a:schemeClr val="lt1"/>
+                </a:solidFill>
+                <a:latin typeface="+mn-lt"/>
+                <a:ea typeface="+mn-ea"/>
+                <a:cs typeface="+mn-cs"/>
+              </a:defRPr>
+            </a:lvl6pPr>
+            <a:lvl7pPr marL="2743200" algn="l" defTabSz="914400" rtl="0" eaLnBrk="1" latinLnBrk="0" hangingPunct="1">
+              <a:defRPr sz="1800" kern="1200">
+                <a:solidFill>
+                  <a:schemeClr val="lt1"/>
+                </a:solidFill>
+                <a:latin typeface="+mn-lt"/>
+                <a:ea typeface="+mn-ea"/>
+                <a:cs typeface="+mn-cs"/>
+              </a:defRPr>
+            </a:lvl7pPr>
+            <a:lvl8pPr marL="3200400" algn="l" defTabSz="914400" rtl="0" eaLnBrk="1" latinLnBrk="0" hangingPunct="1">
+              <a:defRPr sz="1800" kern="1200">
+                <a:solidFill>
+                  <a:schemeClr val="lt1"/>
+                </a:solidFill>
+                <a:latin typeface="+mn-lt"/>
+                <a:ea typeface="+mn-ea"/>
+                <a:cs typeface="+mn-cs"/>
+              </a:defRPr>
+            </a:lvl8pPr>
+            <a:lvl9pPr marL="3657600" algn="l" defTabSz="914400" rtl="0" eaLnBrk="1" latinLnBrk="0" hangingPunct="1">
+              <a:defRPr sz="1800" kern="1200">
+                <a:solidFill>
+                  <a:schemeClr val="lt1"/>
+                </a:solidFill>
+                <a:latin typeface="+mn-lt"/>
+                <a:ea typeface="+mn-ea"/>
+                <a:cs typeface="+mn-cs"/>
+              </a:defRPr>
+            </a:lvl9pPr>
+          </a:lstStyle>
+          <a:p>
+            <a:pPr marL="0" marR="0" lvl="0" indent="0" algn="ctr" defTabSz="914400" rtl="0" eaLnBrk="1" fontAlgn="auto" latinLnBrk="0" hangingPunct="1">
+              <a:lnSpc>
+                <a:spcPct val="100000"/>
+              </a:lnSpc>
+              <a:spcBef>
+                <a:spcPts val="0"/>
+              </a:spcBef>
+              <a:spcAft>
+                <a:spcPts val="0"/>
+              </a:spcAft>
+              <a:buClrTx/>
+              <a:buSzTx/>
+              <a:buFontTx/>
+              <a:buNone/>
+              <a:tabLst/>
+              <a:defRPr/>
+            </a:pPr>
+            <a:endParaRPr kumimoji="0" lang="en-US" sz="1100" b="0" i="0" u="none" strike="noStrike" kern="1200" cap="none" spc="0" normalizeH="0" baseline="0" noProof="0">
+              <a:ln>
+                <a:noFill/>
+              </a:ln>
+              <a:solidFill>
+                <a:prstClr val="white"/>
+              </a:solidFill>
+              <a:effectLst/>
+              <a:uLnTx/>
+              <a:uFillTx/>
+              <a:latin typeface="Mulish Light"/>
+              <a:ea typeface="+mn-ea"/>
+              <a:cs typeface="+mn-cs"/>
+            </a:endParaRPr>
           </a:p>
         </p:txBody>
       </p:sp>
       <p:pic>
         <p:nvPicPr>
-          <p:cNvPr id="6" name="Grafik 5"/>
+          <p:cNvPr id="57" name="Grafik 56">
+            <a:extLst>
+              <a:ext uri="{FF2B5EF4-FFF2-40B4-BE49-F238E27FC236}">
+                <a16:creationId xmlns:a16="http://schemas.microsoft.com/office/drawing/2014/main" id="{0A9AAAFB-5637-4C78-98C7-FEEFFF9FA1AF}"/>
+              </a:ext>
+            </a:extLst>
+          </p:cNvPr>
           <p:cNvPicPr>
             <a:picLocks noChangeAspect="1"/>
           </p:cNvPicPr>
@@ -3321,6 +3462,36 @@
         <p:blipFill rotWithShape="1">
           <a:blip r:embed="rId2" cstate="print">
             <a:extLst>
+              <a:ext uri="{BEBA8EAE-BF5A-486C-A8C5-ECC9F3942E4B}">
+                <a14:imgProps xmlns:a14="http://schemas.microsoft.com/office/drawing/2010/main">
+                  <a14:imgLayer r:embed="rId3">
+                    <a14:imgEffect>
+                      <a14:backgroundRemoval t="31154" b="68654" l="16775" r="37771">
+                        <a14:foregroundMark x1="21753" y1="49423" x2="21753" y2="49423"/>
+                        <a14:foregroundMark x1="25216" y1="48846" x2="25216" y2="48846"/>
+                        <a14:foregroundMark x1="17857" y1="42308" x2="17857" y2="42308"/>
+                        <a14:foregroundMark x1="16775" y1="38654" x2="16775" y2="38654"/>
+                        <a14:foregroundMark x1="25541" y1="57692" x2="25541" y2="57692"/>
+                        <a14:foregroundMark x1="27056" y1="55577" x2="27056" y2="55577"/>
+                        <a14:foregroundMark x1="34848" y1="45962" x2="34848" y2="45962"/>
+                        <a14:foregroundMark x1="32792" y1="45000" x2="32792" y2="45000"/>
+                        <a14:foregroundMark x1="35390" y1="56154" x2="35390" y2="56154"/>
+                        <a14:foregroundMark x1="30303" y1="68654" x2="30303" y2="68654"/>
+                        <a14:foregroundMark x1="27489" y1="64808" x2="27489" y2="64808"/>
+                        <a14:foregroundMark x1="26840" y1="62115" x2="26840" y2="62115"/>
+                        <a14:foregroundMark x1="31277" y1="31346" x2="31277" y2="31346"/>
+                        <a14:foregroundMark x1="20238" y1="31923" x2="20238" y2="31923"/>
+                        <a14:foregroundMark x1="18074" y1="33846" x2="18074" y2="33846"/>
+                        <a14:foregroundMark x1="18182" y1="50192" x2="18182" y2="50192"/>
+                        <a14:foregroundMark x1="19372" y1="55962" x2="19372" y2="55962"/>
+                        <a14:foregroundMark x1="21429" y1="58269" x2="21429" y2="58269"/>
+                        <a14:foregroundMark x1="23052" y1="56923" x2="23052" y2="56923"/>
+                        <a14:foregroundMark x1="37771" y1="54231" x2="37771" y2="54231"/>
+                      </a14:backgroundRemoval>
+                    </a14:imgEffect>
+                  </a14:imgLayer>
+                </a14:imgProps>
+              </a:ext>
               <a:ext uri="{28A0092B-C50C-407E-A947-70E740481C1C}">
                 <a14:useLocalDpi xmlns:a14="http://schemas.microsoft.com/office/drawing/2010/main" val="0"/>
               </a:ext>
@@ -3331,25 +3502,68 @@
         </p:blipFill>
         <p:spPr>
           <a:xfrm>
-            <a:off x="9939404" y="2821895"/>
+            <a:off x="9604311" y="3166740"/>
             <a:ext cx="886497" cy="910136"/>
           </a:xfrm>
           <a:prstGeom prst="rect">
             <a:avLst/>
           </a:prstGeom>
+          <a:effectLst>
+            <a:outerShdw blurRad="50800" dist="38100" dir="2700000" algn="tl" rotWithShape="0">
+              <a:prstClr val="black">
+                <a:alpha val="40000"/>
+              </a:prstClr>
+            </a:outerShdw>
+          </a:effectLst>
         </p:spPr>
       </p:pic>
       <p:pic>
         <p:nvPicPr>
-          <p:cNvPr id="7" name="Grafik 6"/>
+          <p:cNvPr id="58" name="Grafik 57">
+            <a:extLst>
+              <a:ext uri="{FF2B5EF4-FFF2-40B4-BE49-F238E27FC236}">
+                <a16:creationId xmlns:a16="http://schemas.microsoft.com/office/drawing/2014/main" id="{DE94CC44-FC48-48F2-8827-9F7C431F38F4}"/>
+              </a:ext>
+            </a:extLst>
+          </p:cNvPr>
           <p:cNvPicPr>
             <a:picLocks noChangeAspect="1"/>
           </p:cNvPicPr>
           <p:nvPr/>
         </p:nvPicPr>
         <p:blipFill>
-          <a:blip r:embed="rId3">
+          <a:blip r:embed="rId4">
             <a:extLst>
+              <a:ext uri="{BEBA8EAE-BF5A-486C-A8C5-ECC9F3942E4B}">
+                <a14:imgProps xmlns:a14="http://schemas.microsoft.com/office/drawing/2010/main">
+                  <a14:imgLayer r:embed="rId5">
+                    <a14:imgEffect>
+                      <a14:backgroundRemoval t="3226" b="91613" l="3042" r="96578">
+                        <a14:foregroundMark x1="36882" y1="86452" x2="36882" y2="86452"/>
+                        <a14:foregroundMark x1="36122" y1="93548" x2="36122" y2="93548"/>
+                        <a14:foregroundMark x1="41825" y1="29677" x2="41825" y2="29677"/>
+                        <a14:foregroundMark x1="36502" y1="16774" x2="36502" y2="16774"/>
+                        <a14:foregroundMark x1="38403" y1="23226" x2="38403" y2="23226"/>
+                        <a14:foregroundMark x1="50190" y1="24516" x2="50190" y2="24516"/>
+                        <a14:foregroundMark x1="58935" y1="20645" x2="58935" y2="20645"/>
+                        <a14:foregroundMark x1="70722" y1="25806" x2="70722" y2="25806"/>
+                        <a14:foregroundMark x1="77947" y1="19355" x2="77947" y2="19355"/>
+                        <a14:foregroundMark x1="79087" y1="3226" x2="79087" y2="3226"/>
+                        <a14:foregroundMark x1="96578" y1="30968" x2="96578" y2="30968"/>
+                        <a14:foregroundMark x1="90494" y1="18065" x2="90494" y2="18065"/>
+                        <a14:foregroundMark x1="86312" y1="10968" x2="86312" y2="10968"/>
+                        <a14:foregroundMark x1="88213" y1="33548" x2="88213" y2="33548"/>
+                        <a14:foregroundMark x1="78707" y1="31613" x2="78707" y2="31613"/>
+                        <a14:foregroundMark x1="66920" y1="36774" x2="66920" y2="36774"/>
+                        <a14:foregroundMark x1="61217" y1="35484" x2="61217" y2="35484"/>
+                        <a14:foregroundMark x1="61597" y1="9677" x2="61597" y2="9677"/>
+                        <a14:foregroundMark x1="11787" y1="18065" x2="11787" y2="18065"/>
+                        <a14:foregroundMark x1="3042" y1="24516" x2="3042" y2="24516"/>
+                      </a14:backgroundRemoval>
+                    </a14:imgEffect>
+                  </a14:imgLayer>
+                </a14:imgProps>
+              </a:ext>
               <a:ext uri="{28A0092B-C50C-407E-A947-70E740481C1C}">
                 <a14:useLocalDpi xmlns:a14="http://schemas.microsoft.com/office/drawing/2010/main" val="0"/>
               </a:ext>
@@ -3361,77 +3575,30 @@
         </p:blipFill>
         <p:spPr>
           <a:xfrm>
-            <a:off x="9389331" y="3795626"/>
+            <a:off x="9571993" y="4202526"/>
             <a:ext cx="1100146" cy="648375"/>
           </a:xfrm>
           <a:prstGeom prst="rect">
             <a:avLst/>
           </a:prstGeom>
+          <a:effectLst>
+            <a:outerShdw blurRad="50800" dist="38100" dir="2700000" algn="tl" rotWithShape="0">
+              <a:prstClr val="black">
+                <a:alpha val="40000"/>
+              </a:prstClr>
+            </a:outerShdw>
+          </a:effectLst>
         </p:spPr>
       </p:pic>
       <p:pic>
         <p:nvPicPr>
-          <p:cNvPr id="8" name="Grafik 7"/>
-          <p:cNvPicPr>
-            <a:picLocks noChangeAspect="1"/>
-          </p:cNvPicPr>
-          <p:nvPr/>
-        </p:nvPicPr>
-        <p:blipFill>
-          <a:blip r:embed="rId4" cstate="print">
+          <p:cNvPr id="59" name="Grafik 58">
             <a:extLst>
-              <a:ext uri="{28A0092B-C50C-407E-A947-70E740481C1C}">
-                <a14:useLocalDpi xmlns:a14="http://schemas.microsoft.com/office/drawing/2010/main" val="0"/>
+              <a:ext uri="{FF2B5EF4-FFF2-40B4-BE49-F238E27FC236}">
+                <a16:creationId xmlns:a16="http://schemas.microsoft.com/office/drawing/2014/main" id="{C910977D-9AF0-47D9-AFBF-776BBEAF28C6}"/>
               </a:ext>
             </a:extLst>
-          </a:blip>
-          <a:stretch>
-            <a:fillRect/>
-          </a:stretch>
-        </p:blipFill>
-        <p:spPr>
-          <a:xfrm>
-            <a:off x="3652370" y="3219426"/>
-            <a:ext cx="1420420" cy="1230871"/>
-          </a:xfrm>
-          <a:prstGeom prst="rect">
-            <a:avLst/>
-          </a:prstGeom>
-        </p:spPr>
-      </p:pic>
-      <p:pic>
-        <p:nvPicPr>
-          <p:cNvPr id="9" name="Grafik 8"/>
-          <p:cNvPicPr>
-            <a:picLocks noChangeAspect="1"/>
-          </p:cNvPicPr>
-          <p:nvPr/>
-        </p:nvPicPr>
-        <p:blipFill>
-          <a:blip r:embed="rId5">
-            <a:extLst>
-              <a:ext uri="{28A0092B-C50C-407E-A947-70E740481C1C}">
-                <a14:useLocalDpi xmlns:a14="http://schemas.microsoft.com/office/drawing/2010/main" val="0"/>
-              </a:ext>
-            </a:extLst>
-          </a:blip>
-          <a:stretch>
-            <a:fillRect/>
-          </a:stretch>
-        </p:blipFill>
-        <p:spPr>
-          <a:xfrm>
-            <a:off x="6889119" y="2670496"/>
-            <a:ext cx="1683823" cy="1683823"/>
-          </a:xfrm>
-          <a:prstGeom prst="rect">
-            <a:avLst/>
-          </a:prstGeom>
-        </p:spPr>
-      </p:pic>
-      <p:pic>
-        <p:nvPicPr>
-          <p:cNvPr id="11" name="Grafik 10"/>
+          </p:cNvPr>
           <p:cNvPicPr>
             <a:picLocks noChangeAspect="1"/>
           </p:cNvPicPr>
@@ -3451,17 +3618,30 @@
         </p:blipFill>
         <p:spPr>
           <a:xfrm>
-            <a:off x="3702877" y="4631335"/>
-            <a:ext cx="1369913" cy="1369913"/>
+            <a:off x="3537185" y="3573844"/>
+            <a:ext cx="906514" cy="743547"/>
           </a:xfrm>
           <a:prstGeom prst="rect">
             <a:avLst/>
           </a:prstGeom>
+          <a:effectLst>
+            <a:outerShdw blurRad="50800" dist="38100" dir="2700000" algn="tl" rotWithShape="0">
+              <a:prstClr val="black">
+                <a:alpha val="40000"/>
+              </a:prstClr>
+            </a:outerShdw>
+          </a:effectLst>
         </p:spPr>
       </p:pic>
       <p:pic>
         <p:nvPicPr>
-          <p:cNvPr id="13" name="Grafik 12"/>
+          <p:cNvPr id="60" name="Grafik 59">
+            <a:extLst>
+              <a:ext uri="{FF2B5EF4-FFF2-40B4-BE49-F238E27FC236}">
+                <a16:creationId xmlns:a16="http://schemas.microsoft.com/office/drawing/2014/main" id="{02897674-1BD4-4306-9250-91C7AFFBB5B6}"/>
+              </a:ext>
+            </a:extLst>
+          </p:cNvPr>
           <p:cNvPicPr>
             <a:picLocks noChangeAspect="1"/>
           </p:cNvPicPr>
@@ -3481,411 +3661,37 @@
         </p:blipFill>
         <p:spPr>
           <a:xfrm>
-            <a:off x="10681270" y="3736706"/>
-            <a:ext cx="724584" cy="702289"/>
+            <a:off x="6057428" y="2484413"/>
+            <a:ext cx="1683823" cy="1683823"/>
           </a:xfrm>
           <a:prstGeom prst="rect">
             <a:avLst/>
           </a:prstGeom>
+          <a:effectLst>
+            <a:outerShdw blurRad="50800" dist="38100" dir="2700000" algn="tl" rotWithShape="0">
+              <a:prstClr val="black">
+                <a:alpha val="40000"/>
+              </a:prstClr>
+            </a:outerShdw>
+          </a:effectLst>
         </p:spPr>
       </p:pic>
-      <p:sp>
-        <p:nvSpPr>
-          <p:cNvPr id="2" name="Ellipse 1"/>
-          <p:cNvSpPr/>
-          <p:nvPr/>
-        </p:nvSpPr>
-        <p:spPr>
-          <a:xfrm>
-            <a:off x="6864881" y="857181"/>
-            <a:ext cx="5055570" cy="5544589"/>
-          </a:xfrm>
-          <a:prstGeom prst="ellipse">
-            <a:avLst/>
-          </a:prstGeom>
-          <a:noFill/>
-          <a:ln w="57150">
-            <a:solidFill>
-              <a:srgbClr val="283648"/>
-            </a:solidFill>
-          </a:ln>
-        </p:spPr>
-        <p:style>
-          <a:lnRef idx="2">
-            <a:schemeClr val="accent1">
-              <a:shade val="50000"/>
-            </a:schemeClr>
-          </a:lnRef>
-          <a:fillRef idx="1">
-            <a:schemeClr val="accent1"/>
-          </a:fillRef>
-          <a:effectRef idx="0">
-            <a:schemeClr val="accent1"/>
-          </a:effectRef>
-          <a:fontRef idx="minor">
-            <a:schemeClr val="lt1"/>
-          </a:fontRef>
-        </p:style>
-        <p:txBody>
-          <a:bodyPr rtlCol="0" anchor="ctr"/>
-          <a:lstStyle/>
-          <a:p>
-            <a:pPr algn="ctr"/>
-            <a:endParaRPr lang="en-US"/>
-          </a:p>
-        </p:txBody>
-      </p:sp>
-      <p:cxnSp>
-        <p:nvCxnSpPr>
-          <p:cNvPr id="14" name="Gerade Verbindung mit Pfeil 13"/>
-          <p:cNvCxnSpPr/>
-          <p:nvPr/>
-        </p:nvCxnSpPr>
-        <p:spPr>
-          <a:xfrm>
-            <a:off x="8392468" y="3528290"/>
-            <a:ext cx="694773" cy="8486"/>
-          </a:xfrm>
-          <a:prstGeom prst="straightConnector1">
-            <a:avLst/>
-          </a:prstGeom>
-          <a:ln w="57150">
-            <a:solidFill>
-              <a:srgbClr val="2BB381"/>
-            </a:solidFill>
-            <a:headEnd type="triangle"/>
-            <a:tailEnd type="triangle"/>
-          </a:ln>
-        </p:spPr>
-        <p:style>
-          <a:lnRef idx="1">
-            <a:schemeClr val="accent1"/>
-          </a:lnRef>
-          <a:fillRef idx="0">
-            <a:schemeClr val="accent1"/>
-          </a:fillRef>
-          <a:effectRef idx="0">
-            <a:schemeClr val="accent1"/>
-          </a:effectRef>
-          <a:fontRef idx="minor">
-            <a:schemeClr val="tx1"/>
-          </a:fontRef>
-        </p:style>
-      </p:cxnSp>
-      <p:sp>
-        <p:nvSpPr>
-          <p:cNvPr id="18" name="Ellipse 17"/>
-          <p:cNvSpPr/>
-          <p:nvPr/>
-        </p:nvSpPr>
-        <p:spPr>
-          <a:xfrm>
-            <a:off x="2985578" y="768185"/>
-            <a:ext cx="2754003" cy="5544589"/>
-          </a:xfrm>
-          <a:prstGeom prst="ellipse">
-            <a:avLst/>
-          </a:prstGeom>
-          <a:noFill/>
-          <a:ln w="57150">
-            <a:solidFill>
-              <a:srgbClr val="283648"/>
-            </a:solidFill>
-          </a:ln>
-        </p:spPr>
-        <p:style>
-          <a:lnRef idx="2">
-            <a:schemeClr val="accent1">
-              <a:shade val="50000"/>
-            </a:schemeClr>
-          </a:lnRef>
-          <a:fillRef idx="1">
-            <a:schemeClr val="accent1"/>
-          </a:fillRef>
-          <a:effectRef idx="0">
-            <a:schemeClr val="accent1"/>
-          </a:effectRef>
-          <a:fontRef idx="minor">
-            <a:schemeClr val="lt1"/>
-          </a:fontRef>
-        </p:style>
-        <p:txBody>
-          <a:bodyPr rtlCol="0" anchor="ctr"/>
-          <a:lstStyle/>
-          <a:p>
-            <a:pPr algn="ctr"/>
-            <a:endParaRPr lang="en-US"/>
-          </a:p>
-        </p:txBody>
-      </p:sp>
       <p:pic>
         <p:nvPicPr>
-          <p:cNvPr id="19" name="Grafik 18"/>
-          <p:cNvPicPr>
-            <a:picLocks noChangeAspect="1"/>
-          </p:cNvPicPr>
-          <p:nvPr/>
-        </p:nvPicPr>
-        <p:blipFill rotWithShape="1">
-          <a:blip r:embed="rId8">
+          <p:cNvPr id="61" name="Grafik 60">
             <a:extLst>
-              <a:ext uri="{28A0092B-C50C-407E-A947-70E740481C1C}">
-                <a14:useLocalDpi xmlns:a14="http://schemas.microsoft.com/office/drawing/2010/main" val="0"/>
+              <a:ext uri="{FF2B5EF4-FFF2-40B4-BE49-F238E27FC236}">
+                <a16:creationId xmlns:a16="http://schemas.microsoft.com/office/drawing/2014/main" id="{30821D8A-7F1E-48B6-B86B-F39871565D99}"/>
               </a:ext>
             </a:extLst>
-          </a:blip>
-          <a:srcRect l="23292" t="23903" r="23949" b="23782"/>
-          <a:stretch/>
-        </p:blipFill>
-        <p:spPr>
-          <a:xfrm>
-            <a:off x="3804449" y="1487051"/>
-            <a:ext cx="1166767" cy="1156921"/>
-          </a:xfrm>
-          <a:prstGeom prst="rect">
-            <a:avLst/>
-          </a:prstGeom>
-        </p:spPr>
-      </p:pic>
-      <p:cxnSp>
-        <p:nvCxnSpPr>
-          <p:cNvPr id="20" name="Gerade Verbindung mit Pfeil 19"/>
-          <p:cNvCxnSpPr/>
-          <p:nvPr/>
-        </p:nvCxnSpPr>
-        <p:spPr>
-          <a:xfrm>
-            <a:off x="5871781" y="3540479"/>
-            <a:ext cx="845421" cy="16971"/>
-          </a:xfrm>
-          <a:prstGeom prst="straightConnector1">
-            <a:avLst/>
-          </a:prstGeom>
-          <a:ln w="57150">
-            <a:solidFill>
-              <a:srgbClr val="2BB381"/>
-            </a:solidFill>
-            <a:headEnd type="triangle"/>
-            <a:tailEnd type="triangle"/>
-          </a:ln>
-        </p:spPr>
-        <p:style>
-          <a:lnRef idx="1">
-            <a:schemeClr val="accent1"/>
-          </a:lnRef>
-          <a:fillRef idx="0">
-            <a:schemeClr val="accent1"/>
-          </a:fillRef>
-          <a:effectRef idx="0">
-            <a:schemeClr val="accent1"/>
-          </a:effectRef>
-          <a:fontRef idx="minor">
-            <a:schemeClr val="tx1"/>
-          </a:fontRef>
-        </p:style>
-      </p:cxnSp>
-      <p:sp>
-        <p:nvSpPr>
-          <p:cNvPr id="21" name="Textfeld 20"/>
-          <p:cNvSpPr txBox="1"/>
-          <p:nvPr/>
-        </p:nvSpPr>
-        <p:spPr>
-          <a:xfrm>
-            <a:off x="5888122" y="2429525"/>
-            <a:ext cx="753732" cy="369332"/>
-          </a:xfrm>
-          <a:prstGeom prst="rect">
-            <a:avLst/>
-          </a:prstGeom>
-          <a:noFill/>
-        </p:spPr>
-        <p:txBody>
-          <a:bodyPr wrap="none" rtlCol="0">
-            <a:spAutoFit/>
-          </a:bodyPr>
-          <a:lstStyle/>
-          <a:p>
-            <a:r>
-              <a:rPr lang="de-DE" dirty="0" smtClean="0">
-                <a:latin typeface="Mulish" pitchFamily="2" charset="0"/>
-              </a:rPr>
-              <a:t>JSON</a:t>
-            </a:r>
-            <a:endParaRPr lang="en-US" dirty="0">
-              <a:latin typeface="Mulish" pitchFamily="2" charset="0"/>
-            </a:endParaRPr>
-          </a:p>
-        </p:txBody>
-      </p:sp>
-      <p:sp>
-        <p:nvSpPr>
-          <p:cNvPr id="22" name="Textfeld 21"/>
-          <p:cNvSpPr txBox="1"/>
-          <p:nvPr/>
-        </p:nvSpPr>
-        <p:spPr>
-          <a:xfrm>
-            <a:off x="5820253" y="2907631"/>
-            <a:ext cx="958917" cy="369332"/>
-          </a:xfrm>
-          <a:prstGeom prst="rect">
-            <a:avLst/>
-          </a:prstGeom>
-          <a:noFill/>
-        </p:spPr>
-        <p:txBody>
-          <a:bodyPr wrap="none" rtlCol="0">
-            <a:spAutoFit/>
-          </a:bodyPr>
-          <a:lstStyle/>
-          <a:p>
-            <a:r>
-              <a:rPr lang="de-DE" dirty="0" err="1" smtClean="0">
-                <a:latin typeface="Mulish" pitchFamily="2" charset="0"/>
-              </a:rPr>
-              <a:t>Geobuf</a:t>
-            </a:r>
-            <a:endParaRPr lang="en-US" dirty="0">
-              <a:latin typeface="Mulish" pitchFamily="2" charset="0"/>
-            </a:endParaRPr>
-          </a:p>
-        </p:txBody>
-      </p:sp>
-      <p:sp>
-        <p:nvSpPr>
-          <p:cNvPr id="23" name="Textfeld 22"/>
-          <p:cNvSpPr txBox="1"/>
-          <p:nvPr/>
-        </p:nvSpPr>
-        <p:spPr>
-          <a:xfrm>
-            <a:off x="5820253" y="3765870"/>
-            <a:ext cx="960519" cy="707886"/>
-          </a:xfrm>
-          <a:prstGeom prst="rect">
-            <a:avLst/>
-          </a:prstGeom>
-          <a:noFill/>
-        </p:spPr>
-        <p:txBody>
-          <a:bodyPr wrap="none" rtlCol="0">
-            <a:spAutoFit/>
-          </a:bodyPr>
-          <a:lstStyle/>
-          <a:p>
-            <a:pPr algn="ctr"/>
-            <a:r>
-              <a:rPr lang="en-US" sz="2000" dirty="0" smtClean="0">
-                <a:latin typeface="Mulish" pitchFamily="2" charset="0"/>
-              </a:rPr>
-              <a:t>Vector</a:t>
-            </a:r>
-          </a:p>
-          <a:p>
-            <a:pPr algn="ctr"/>
-            <a:r>
-              <a:rPr lang="en-US" sz="2000" dirty="0" smtClean="0">
-                <a:latin typeface="Mulish" pitchFamily="2" charset="0"/>
-              </a:rPr>
-              <a:t>tiles</a:t>
-            </a:r>
-            <a:endParaRPr lang="en-US" sz="2000" dirty="0">
-              <a:latin typeface="Mulish" pitchFamily="2" charset="0"/>
-            </a:endParaRPr>
-          </a:p>
-        </p:txBody>
-      </p:sp>
-      <p:sp>
-        <p:nvSpPr>
-          <p:cNvPr id="27" name="Textfeld 26"/>
-          <p:cNvSpPr txBox="1"/>
-          <p:nvPr/>
-        </p:nvSpPr>
-        <p:spPr>
-          <a:xfrm>
-            <a:off x="8572942" y="21992"/>
-            <a:ext cx="1531188" cy="646331"/>
-          </a:xfrm>
-          <a:prstGeom prst="rect">
-            <a:avLst/>
-          </a:prstGeom>
-          <a:noFill/>
-        </p:spPr>
-        <p:txBody>
-          <a:bodyPr wrap="none" rtlCol="0">
-            <a:spAutoFit/>
-          </a:bodyPr>
-          <a:lstStyle/>
-          <a:p>
-            <a:r>
-              <a:rPr lang="de-DE" sz="3600" b="1" dirty="0" smtClean="0">
-                <a:solidFill>
-                  <a:srgbClr val="2BB381"/>
-                </a:solidFill>
-                <a:latin typeface="Mulish" pitchFamily="2" charset="0"/>
-              </a:rPr>
-              <a:t>Server</a:t>
-            </a:r>
-            <a:endParaRPr lang="en-US" sz="3600" b="1" dirty="0">
-              <a:solidFill>
-                <a:srgbClr val="2BB381"/>
-              </a:solidFill>
-              <a:latin typeface="Mulish" pitchFamily="2" charset="0"/>
-            </a:endParaRPr>
-          </a:p>
-        </p:txBody>
-      </p:sp>
-      <p:sp>
-        <p:nvSpPr>
-          <p:cNvPr id="28" name="Textfeld 27"/>
-          <p:cNvSpPr txBox="1"/>
-          <p:nvPr/>
-        </p:nvSpPr>
-        <p:spPr>
-          <a:xfrm>
-            <a:off x="3652370" y="74328"/>
-            <a:ext cx="1382110" cy="646331"/>
-          </a:xfrm>
-          <a:prstGeom prst="rect">
-            <a:avLst/>
-          </a:prstGeom>
-          <a:noFill/>
-        </p:spPr>
-        <p:txBody>
-          <a:bodyPr wrap="none" rtlCol="0">
-            <a:spAutoFit/>
-          </a:bodyPr>
-          <a:lstStyle/>
-          <a:p>
-            <a:r>
-              <a:rPr lang="de-DE" sz="3600" b="1" dirty="0" smtClean="0">
-                <a:solidFill>
-                  <a:srgbClr val="2BB381"/>
-                </a:solidFill>
-                <a:latin typeface="Mulish" pitchFamily="2" charset="0"/>
-              </a:rPr>
-              <a:t>Client</a:t>
-            </a:r>
-            <a:endParaRPr lang="en-US" sz="3600" b="1" dirty="0">
-              <a:solidFill>
-                <a:srgbClr val="2BB381"/>
-              </a:solidFill>
-              <a:latin typeface="Mulish" pitchFamily="2" charset="0"/>
-            </a:endParaRPr>
-          </a:p>
-        </p:txBody>
-      </p:sp>
-      <p:pic>
-        <p:nvPicPr>
-          <p:cNvPr id="35" name="Grafik 34"/>
+          </p:cNvPr>
           <p:cNvPicPr>
             <a:picLocks noChangeAspect="1"/>
           </p:cNvPicPr>
           <p:nvPr/>
         </p:nvPicPr>
         <p:blipFill>
-          <a:blip r:embed="rId9">
+          <a:blip r:embed="rId8" cstate="print">
             <a:extLst>
               <a:ext uri="{28A0092B-C50C-407E-A947-70E740481C1C}">
                 <a14:useLocalDpi xmlns:a14="http://schemas.microsoft.com/office/drawing/2010/main" val="0"/>
@@ -3898,24 +3704,118 @@
         </p:blipFill>
         <p:spPr>
           <a:xfrm>
-            <a:off x="717665" y="2922433"/>
-            <a:ext cx="914400" cy="914400"/>
+            <a:off x="3490224" y="4675637"/>
+            <a:ext cx="1006634" cy="1015495"/>
           </a:xfrm>
           <a:prstGeom prst="rect">
             <a:avLst/>
           </a:prstGeom>
+          <a:effectLst>
+            <a:outerShdw blurRad="50800" dist="38100" dir="2700000" algn="tl" rotWithShape="0">
+              <a:prstClr val="black">
+                <a:alpha val="40000"/>
+              </a:prstClr>
+            </a:outerShdw>
+          </a:effectLst>
         </p:spPr>
       </p:pic>
-      <p:sp>
-        <p:nvSpPr>
-          <p:cNvPr id="36" name="Textfeld 35"/>
+      <p:pic>
+        <p:nvPicPr>
+          <p:cNvPr id="62" name="Grafik 61">
+            <a:extLst>
+              <a:ext uri="{FF2B5EF4-FFF2-40B4-BE49-F238E27FC236}">
+                <a16:creationId xmlns:a16="http://schemas.microsoft.com/office/drawing/2014/main" id="{BAAB7DB7-A6DB-4258-B5D9-36459558F2A2}"/>
+              </a:ext>
+            </a:extLst>
+          </p:cNvPr>
+          <p:cNvPicPr>
+            <a:picLocks noChangeAspect="1"/>
+          </p:cNvPicPr>
+          <p:nvPr/>
+        </p:nvPicPr>
+        <p:blipFill rotWithShape="1">
+          <a:blip r:embed="rId9" cstate="print">
+            <a:extLst>
+              <a:ext uri="{28A0092B-C50C-407E-A947-70E740481C1C}">
+                <a14:useLocalDpi xmlns:a14="http://schemas.microsoft.com/office/drawing/2010/main" val="0"/>
+              </a:ext>
+            </a:extLst>
+          </a:blip>
+          <a:srcRect l="23292" t="23903" r="23949" b="23782"/>
+          <a:stretch/>
+        </p:blipFill>
+        <p:spPr>
+          <a:xfrm>
+            <a:off x="3565216" y="2311074"/>
+            <a:ext cx="856651" cy="855666"/>
+          </a:xfrm>
+          <a:prstGeom prst="rect">
+            <a:avLst/>
+          </a:prstGeom>
+          <a:effectLst>
+            <a:outerShdw blurRad="50800" dist="38100" dir="2700000" algn="tl" rotWithShape="0">
+              <a:prstClr val="black">
+                <a:alpha val="40000"/>
+              </a:prstClr>
+            </a:outerShdw>
+          </a:effectLst>
+        </p:spPr>
+      </p:pic>
+      <p:cxnSp>
+        <p:nvCxnSpPr>
+          <p:cNvPr id="63" name="Gerade Verbindung mit Pfeil 62">
+            <a:extLst>
+              <a:ext uri="{FF2B5EF4-FFF2-40B4-BE49-F238E27FC236}">
+                <a16:creationId xmlns:a16="http://schemas.microsoft.com/office/drawing/2014/main" id="{C9B79DCF-B7BF-4301-A6DE-72DBC9B07936}"/>
+              </a:ext>
+            </a:extLst>
+          </p:cNvPr>
+          <p:cNvCxnSpPr/>
+          <p:nvPr/>
+        </p:nvCxnSpPr>
+        <p:spPr>
+          <a:xfrm>
+            <a:off x="5032380" y="3850970"/>
+            <a:ext cx="845421" cy="16971"/>
+          </a:xfrm>
+          <a:prstGeom prst="straightConnector1">
+            <a:avLst/>
+          </a:prstGeom>
+          <a:noFill/>
+          <a:ln w="57150" cap="flat" cmpd="sng" algn="ctr">
+            <a:solidFill>
+              <a:srgbClr val="2BB381"/>
+            </a:solidFill>
+            <a:prstDash val="solid"/>
+            <a:miter lim="800000"/>
+            <a:headEnd type="triangle"/>
+            <a:tailEnd type="triangle"/>
+          </a:ln>
+          <a:effectLst>
+            <a:outerShdw blurRad="50800" dist="38100" dir="2700000" algn="tl" rotWithShape="0">
+              <a:prstClr val="black">
+                <a:alpha val="40000"/>
+              </a:prstClr>
+            </a:outerShdw>
+          </a:effectLst>
+        </p:spPr>
+      </p:cxnSp>
+      <p:sp>
+        <p:nvSpPr>
+          <p:cNvPr id="64" name="Textfeld 20">
+            <a:extLst>
+              <a:ext uri="{FF2B5EF4-FFF2-40B4-BE49-F238E27FC236}">
+                <a16:creationId xmlns:a16="http://schemas.microsoft.com/office/drawing/2014/main" id="{C6503F0F-4AA3-4D95-ABA7-FC49A731D3C4}"/>
+              </a:ext>
+            </a:extLst>
+          </p:cNvPr>
           <p:cNvSpPr txBox="1"/>
           <p:nvPr/>
         </p:nvSpPr>
         <p:spPr>
           <a:xfrm>
-            <a:off x="577097" y="2175564"/>
-            <a:ext cx="1154483" cy="646331"/>
+            <a:off x="5109483" y="2872548"/>
+            <a:ext cx="691215" cy="338554"/>
           </a:xfrm>
           <a:prstGeom prst="rect">
             <a:avLst/>
@@ -3923,21 +3823,542 @@
           <a:noFill/>
         </p:spPr>
         <p:txBody>
+          <a:bodyPr wrap="none" lIns="91440" tIns="45720" rIns="91440" bIns="45720" rtlCol="0" anchor="t">
+            <a:spAutoFit/>
+          </a:bodyPr>
+          <a:lstStyle>
+            <a:defPPr>
+              <a:defRPr lang="en-US"/>
+            </a:defPPr>
+            <a:lvl1pPr marL="0" algn="l" defTabSz="914400" rtl="0" eaLnBrk="1" latinLnBrk="0" hangingPunct="1">
+              <a:defRPr sz="1800" kern="1200">
+                <a:solidFill>
+                  <a:schemeClr val="tx1"/>
+                </a:solidFill>
+                <a:latin typeface="+mn-lt"/>
+                <a:ea typeface="+mn-ea"/>
+                <a:cs typeface="+mn-cs"/>
+              </a:defRPr>
+            </a:lvl1pPr>
+            <a:lvl2pPr marL="457200" algn="l" defTabSz="914400" rtl="0" eaLnBrk="1" latinLnBrk="0" hangingPunct="1">
+              <a:defRPr sz="1800" kern="1200">
+                <a:solidFill>
+                  <a:schemeClr val="tx1"/>
+                </a:solidFill>
+                <a:latin typeface="+mn-lt"/>
+                <a:ea typeface="+mn-ea"/>
+                <a:cs typeface="+mn-cs"/>
+              </a:defRPr>
+            </a:lvl2pPr>
+            <a:lvl3pPr marL="914400" algn="l" defTabSz="914400" rtl="0" eaLnBrk="1" latinLnBrk="0" hangingPunct="1">
+              <a:defRPr sz="1800" kern="1200">
+                <a:solidFill>
+                  <a:schemeClr val="tx1"/>
+                </a:solidFill>
+                <a:latin typeface="+mn-lt"/>
+                <a:ea typeface="+mn-ea"/>
+                <a:cs typeface="+mn-cs"/>
+              </a:defRPr>
+            </a:lvl3pPr>
+            <a:lvl4pPr marL="1371600" algn="l" defTabSz="914400" rtl="0" eaLnBrk="1" latinLnBrk="0" hangingPunct="1">
+              <a:defRPr sz="1800" kern="1200">
+                <a:solidFill>
+                  <a:schemeClr val="tx1"/>
+                </a:solidFill>
+                <a:latin typeface="+mn-lt"/>
+                <a:ea typeface="+mn-ea"/>
+                <a:cs typeface="+mn-cs"/>
+              </a:defRPr>
+            </a:lvl4pPr>
+            <a:lvl5pPr marL="1828800" algn="l" defTabSz="914400" rtl="0" eaLnBrk="1" latinLnBrk="0" hangingPunct="1">
+              <a:defRPr sz="1800" kern="1200">
+                <a:solidFill>
+                  <a:schemeClr val="tx1"/>
+                </a:solidFill>
+                <a:latin typeface="+mn-lt"/>
+                <a:ea typeface="+mn-ea"/>
+                <a:cs typeface="+mn-cs"/>
+              </a:defRPr>
+            </a:lvl5pPr>
+            <a:lvl6pPr marL="2286000" algn="l" defTabSz="914400" rtl="0" eaLnBrk="1" latinLnBrk="0" hangingPunct="1">
+              <a:defRPr sz="1800" kern="1200">
+                <a:solidFill>
+                  <a:schemeClr val="tx1"/>
+                </a:solidFill>
+                <a:latin typeface="+mn-lt"/>
+                <a:ea typeface="+mn-ea"/>
+                <a:cs typeface="+mn-cs"/>
+              </a:defRPr>
+            </a:lvl6pPr>
+            <a:lvl7pPr marL="2743200" algn="l" defTabSz="914400" rtl="0" eaLnBrk="1" latinLnBrk="0" hangingPunct="1">
+              <a:defRPr sz="1800" kern="1200">
+                <a:solidFill>
+                  <a:schemeClr val="tx1"/>
+                </a:solidFill>
+                <a:latin typeface="+mn-lt"/>
+                <a:ea typeface="+mn-ea"/>
+                <a:cs typeface="+mn-cs"/>
+              </a:defRPr>
+            </a:lvl7pPr>
+            <a:lvl8pPr marL="3200400" algn="l" defTabSz="914400" rtl="0" eaLnBrk="1" latinLnBrk="0" hangingPunct="1">
+              <a:defRPr sz="1800" kern="1200">
+                <a:solidFill>
+                  <a:schemeClr val="tx1"/>
+                </a:solidFill>
+                <a:latin typeface="+mn-lt"/>
+                <a:ea typeface="+mn-ea"/>
+                <a:cs typeface="+mn-cs"/>
+              </a:defRPr>
+            </a:lvl8pPr>
+            <a:lvl9pPr marL="3657600" algn="l" defTabSz="914400" rtl="0" eaLnBrk="1" latinLnBrk="0" hangingPunct="1">
+              <a:defRPr sz="1800" kern="1200">
+                <a:solidFill>
+                  <a:schemeClr val="tx1"/>
+                </a:solidFill>
+                <a:latin typeface="+mn-lt"/>
+                <a:ea typeface="+mn-ea"/>
+                <a:cs typeface="+mn-cs"/>
+              </a:defRPr>
+            </a:lvl9pPr>
+          </a:lstStyle>
+          <a:p>
+            <a:r>
+              <a:rPr lang="de-DE" sz="1600" dirty="0">
+                <a:solidFill>
+                  <a:prstClr val="black"/>
+                </a:solidFill>
+                <a:latin typeface="Mulish"/>
+              </a:rPr>
+              <a:t>JSON</a:t>
+            </a:r>
+            <a:endParaRPr lang="en-US" sz="1600">
+              <a:solidFill>
+                <a:prstClr val="black"/>
+              </a:solidFill>
+              <a:latin typeface="Mulish"/>
+            </a:endParaRPr>
+          </a:p>
+        </p:txBody>
+      </p:sp>
+      <p:sp>
+        <p:nvSpPr>
+          <p:cNvPr id="65" name="Textfeld 21">
+            <a:extLst>
+              <a:ext uri="{FF2B5EF4-FFF2-40B4-BE49-F238E27FC236}">
+                <a16:creationId xmlns:a16="http://schemas.microsoft.com/office/drawing/2014/main" id="{C009EFAC-287E-4B8F-B0A7-3D018D9ABB70}"/>
+              </a:ext>
+            </a:extLst>
+          </p:cNvPr>
+          <p:cNvSpPr txBox="1"/>
+          <p:nvPr/>
+        </p:nvSpPr>
+        <p:spPr>
+          <a:xfrm>
+            <a:off x="5017310" y="3217747"/>
+            <a:ext cx="875561" cy="338554"/>
+          </a:xfrm>
+          <a:prstGeom prst="rect">
+            <a:avLst/>
+          </a:prstGeom>
+          <a:noFill/>
+        </p:spPr>
+        <p:txBody>
+          <a:bodyPr wrap="none" lIns="91440" tIns="45720" rIns="91440" bIns="45720" rtlCol="0" anchor="t">
+            <a:spAutoFit/>
+          </a:bodyPr>
+          <a:lstStyle>
+            <a:defPPr>
+              <a:defRPr lang="en-US"/>
+            </a:defPPr>
+            <a:lvl1pPr marL="0" algn="l" defTabSz="914400" rtl="0" eaLnBrk="1" latinLnBrk="0" hangingPunct="1">
+              <a:defRPr sz="1800" kern="1200">
+                <a:solidFill>
+                  <a:schemeClr val="tx1"/>
+                </a:solidFill>
+                <a:latin typeface="+mn-lt"/>
+                <a:ea typeface="+mn-ea"/>
+                <a:cs typeface="+mn-cs"/>
+              </a:defRPr>
+            </a:lvl1pPr>
+            <a:lvl2pPr marL="457200" algn="l" defTabSz="914400" rtl="0" eaLnBrk="1" latinLnBrk="0" hangingPunct="1">
+              <a:defRPr sz="1800" kern="1200">
+                <a:solidFill>
+                  <a:schemeClr val="tx1"/>
+                </a:solidFill>
+                <a:latin typeface="+mn-lt"/>
+                <a:ea typeface="+mn-ea"/>
+                <a:cs typeface="+mn-cs"/>
+              </a:defRPr>
+            </a:lvl2pPr>
+            <a:lvl3pPr marL="914400" algn="l" defTabSz="914400" rtl="0" eaLnBrk="1" latinLnBrk="0" hangingPunct="1">
+              <a:defRPr sz="1800" kern="1200">
+                <a:solidFill>
+                  <a:schemeClr val="tx1"/>
+                </a:solidFill>
+                <a:latin typeface="+mn-lt"/>
+                <a:ea typeface="+mn-ea"/>
+                <a:cs typeface="+mn-cs"/>
+              </a:defRPr>
+            </a:lvl3pPr>
+            <a:lvl4pPr marL="1371600" algn="l" defTabSz="914400" rtl="0" eaLnBrk="1" latinLnBrk="0" hangingPunct="1">
+              <a:defRPr sz="1800" kern="1200">
+                <a:solidFill>
+                  <a:schemeClr val="tx1"/>
+                </a:solidFill>
+                <a:latin typeface="+mn-lt"/>
+                <a:ea typeface="+mn-ea"/>
+                <a:cs typeface="+mn-cs"/>
+              </a:defRPr>
+            </a:lvl4pPr>
+            <a:lvl5pPr marL="1828800" algn="l" defTabSz="914400" rtl="0" eaLnBrk="1" latinLnBrk="0" hangingPunct="1">
+              <a:defRPr sz="1800" kern="1200">
+                <a:solidFill>
+                  <a:schemeClr val="tx1"/>
+                </a:solidFill>
+                <a:latin typeface="+mn-lt"/>
+                <a:ea typeface="+mn-ea"/>
+                <a:cs typeface="+mn-cs"/>
+              </a:defRPr>
+            </a:lvl5pPr>
+            <a:lvl6pPr marL="2286000" algn="l" defTabSz="914400" rtl="0" eaLnBrk="1" latinLnBrk="0" hangingPunct="1">
+              <a:defRPr sz="1800" kern="1200">
+                <a:solidFill>
+                  <a:schemeClr val="tx1"/>
+                </a:solidFill>
+                <a:latin typeface="+mn-lt"/>
+                <a:ea typeface="+mn-ea"/>
+                <a:cs typeface="+mn-cs"/>
+              </a:defRPr>
+            </a:lvl6pPr>
+            <a:lvl7pPr marL="2743200" algn="l" defTabSz="914400" rtl="0" eaLnBrk="1" latinLnBrk="0" hangingPunct="1">
+              <a:defRPr sz="1800" kern="1200">
+                <a:solidFill>
+                  <a:schemeClr val="tx1"/>
+                </a:solidFill>
+                <a:latin typeface="+mn-lt"/>
+                <a:ea typeface="+mn-ea"/>
+                <a:cs typeface="+mn-cs"/>
+              </a:defRPr>
+            </a:lvl7pPr>
+            <a:lvl8pPr marL="3200400" algn="l" defTabSz="914400" rtl="0" eaLnBrk="1" latinLnBrk="0" hangingPunct="1">
+              <a:defRPr sz="1800" kern="1200">
+                <a:solidFill>
+                  <a:schemeClr val="tx1"/>
+                </a:solidFill>
+                <a:latin typeface="+mn-lt"/>
+                <a:ea typeface="+mn-ea"/>
+                <a:cs typeface="+mn-cs"/>
+              </a:defRPr>
+            </a:lvl8pPr>
+            <a:lvl9pPr marL="3657600" algn="l" defTabSz="914400" rtl="0" eaLnBrk="1" latinLnBrk="0" hangingPunct="1">
+              <a:defRPr sz="1800" kern="1200">
+                <a:solidFill>
+                  <a:schemeClr val="tx1"/>
+                </a:solidFill>
+                <a:latin typeface="+mn-lt"/>
+                <a:ea typeface="+mn-ea"/>
+                <a:cs typeface="+mn-cs"/>
+              </a:defRPr>
+            </a:lvl9pPr>
+          </a:lstStyle>
+          <a:p>
+            <a:r>
+              <a:rPr lang="de-DE" sz="1600" dirty="0" err="1">
+                <a:solidFill>
+                  <a:prstClr val="black"/>
+                </a:solidFill>
+                <a:latin typeface="Mulish"/>
+              </a:rPr>
+              <a:t>Geobuf</a:t>
+            </a:r>
+            <a:endParaRPr lang="en-US" sz="1200" dirty="0">
+              <a:solidFill>
+                <a:prstClr val="black"/>
+              </a:solidFill>
+              <a:latin typeface="Mulish"/>
+            </a:endParaRPr>
+          </a:p>
+        </p:txBody>
+      </p:sp>
+      <p:sp>
+        <p:nvSpPr>
+          <p:cNvPr id="66" name="Textfeld 22">
+            <a:extLst>
+              <a:ext uri="{FF2B5EF4-FFF2-40B4-BE49-F238E27FC236}">
+                <a16:creationId xmlns:a16="http://schemas.microsoft.com/office/drawing/2014/main" id="{D9270272-901E-422B-9A35-821581D8B9B3}"/>
+              </a:ext>
+            </a:extLst>
+          </p:cNvPr>
+          <p:cNvSpPr txBox="1"/>
+          <p:nvPr/>
+        </p:nvSpPr>
+        <p:spPr>
+          <a:xfrm>
+            <a:off x="5053377" y="4093708"/>
+            <a:ext cx="803426" cy="584775"/>
+          </a:xfrm>
+          <a:prstGeom prst="rect">
+            <a:avLst/>
+          </a:prstGeom>
+          <a:noFill/>
+        </p:spPr>
+        <p:txBody>
+          <a:bodyPr wrap="none" lIns="91440" tIns="45720" rIns="91440" bIns="45720" rtlCol="0" anchor="t">
+            <a:spAutoFit/>
+          </a:bodyPr>
+          <a:lstStyle>
+            <a:defPPr>
+              <a:defRPr lang="en-US"/>
+            </a:defPPr>
+            <a:lvl1pPr marL="0" algn="l" defTabSz="914400" rtl="0" eaLnBrk="1" latinLnBrk="0" hangingPunct="1">
+              <a:defRPr sz="1800" kern="1200">
+                <a:solidFill>
+                  <a:schemeClr val="tx1"/>
+                </a:solidFill>
+                <a:latin typeface="+mn-lt"/>
+                <a:ea typeface="+mn-ea"/>
+                <a:cs typeface="+mn-cs"/>
+              </a:defRPr>
+            </a:lvl1pPr>
+            <a:lvl2pPr marL="457200" algn="l" defTabSz="914400" rtl="0" eaLnBrk="1" latinLnBrk="0" hangingPunct="1">
+              <a:defRPr sz="1800" kern="1200">
+                <a:solidFill>
+                  <a:schemeClr val="tx1"/>
+                </a:solidFill>
+                <a:latin typeface="+mn-lt"/>
+                <a:ea typeface="+mn-ea"/>
+                <a:cs typeface="+mn-cs"/>
+              </a:defRPr>
+            </a:lvl2pPr>
+            <a:lvl3pPr marL="914400" algn="l" defTabSz="914400" rtl="0" eaLnBrk="1" latinLnBrk="0" hangingPunct="1">
+              <a:defRPr sz="1800" kern="1200">
+                <a:solidFill>
+                  <a:schemeClr val="tx1"/>
+                </a:solidFill>
+                <a:latin typeface="+mn-lt"/>
+                <a:ea typeface="+mn-ea"/>
+                <a:cs typeface="+mn-cs"/>
+              </a:defRPr>
+            </a:lvl3pPr>
+            <a:lvl4pPr marL="1371600" algn="l" defTabSz="914400" rtl="0" eaLnBrk="1" latinLnBrk="0" hangingPunct="1">
+              <a:defRPr sz="1800" kern="1200">
+                <a:solidFill>
+                  <a:schemeClr val="tx1"/>
+                </a:solidFill>
+                <a:latin typeface="+mn-lt"/>
+                <a:ea typeface="+mn-ea"/>
+                <a:cs typeface="+mn-cs"/>
+              </a:defRPr>
+            </a:lvl4pPr>
+            <a:lvl5pPr marL="1828800" algn="l" defTabSz="914400" rtl="0" eaLnBrk="1" latinLnBrk="0" hangingPunct="1">
+              <a:defRPr sz="1800" kern="1200">
+                <a:solidFill>
+                  <a:schemeClr val="tx1"/>
+                </a:solidFill>
+                <a:latin typeface="+mn-lt"/>
+                <a:ea typeface="+mn-ea"/>
+                <a:cs typeface="+mn-cs"/>
+              </a:defRPr>
+            </a:lvl5pPr>
+            <a:lvl6pPr marL="2286000" algn="l" defTabSz="914400" rtl="0" eaLnBrk="1" latinLnBrk="0" hangingPunct="1">
+              <a:defRPr sz="1800" kern="1200">
+                <a:solidFill>
+                  <a:schemeClr val="tx1"/>
+                </a:solidFill>
+                <a:latin typeface="+mn-lt"/>
+                <a:ea typeface="+mn-ea"/>
+                <a:cs typeface="+mn-cs"/>
+              </a:defRPr>
+            </a:lvl6pPr>
+            <a:lvl7pPr marL="2743200" algn="l" defTabSz="914400" rtl="0" eaLnBrk="1" latinLnBrk="0" hangingPunct="1">
+              <a:defRPr sz="1800" kern="1200">
+                <a:solidFill>
+                  <a:schemeClr val="tx1"/>
+                </a:solidFill>
+                <a:latin typeface="+mn-lt"/>
+                <a:ea typeface="+mn-ea"/>
+                <a:cs typeface="+mn-cs"/>
+              </a:defRPr>
+            </a:lvl7pPr>
+            <a:lvl8pPr marL="3200400" algn="l" defTabSz="914400" rtl="0" eaLnBrk="1" latinLnBrk="0" hangingPunct="1">
+              <a:defRPr sz="1800" kern="1200">
+                <a:solidFill>
+                  <a:schemeClr val="tx1"/>
+                </a:solidFill>
+                <a:latin typeface="+mn-lt"/>
+                <a:ea typeface="+mn-ea"/>
+                <a:cs typeface="+mn-cs"/>
+              </a:defRPr>
+            </a:lvl8pPr>
+            <a:lvl9pPr marL="3657600" algn="l" defTabSz="914400" rtl="0" eaLnBrk="1" latinLnBrk="0" hangingPunct="1">
+              <a:defRPr sz="1800" kern="1200">
+                <a:solidFill>
+                  <a:schemeClr val="tx1"/>
+                </a:solidFill>
+                <a:latin typeface="+mn-lt"/>
+                <a:ea typeface="+mn-ea"/>
+                <a:cs typeface="+mn-cs"/>
+              </a:defRPr>
+            </a:lvl9pPr>
+          </a:lstStyle>
+          <a:p>
+            <a:pPr algn="ctr"/>
+            <a:r>
+              <a:rPr lang="en-US" sz="1600" dirty="0">
+                <a:solidFill>
+                  <a:prstClr val="black"/>
+                </a:solidFill>
+                <a:latin typeface="Mulish"/>
+              </a:rPr>
+              <a:t>Vector</a:t>
+            </a:r>
+          </a:p>
+          <a:p>
+            <a:pPr algn="ctr"/>
+            <a:r>
+              <a:rPr lang="en-US" sz="1600" dirty="0">
+                <a:solidFill>
+                  <a:prstClr val="black"/>
+                </a:solidFill>
+                <a:latin typeface="Mulish"/>
+              </a:rPr>
+              <a:t>tiles</a:t>
+            </a:r>
+          </a:p>
+        </p:txBody>
+      </p:sp>
+      <p:sp>
+        <p:nvSpPr>
+          <p:cNvPr id="67" name="Textfeld 26">
+            <a:extLst>
+              <a:ext uri="{FF2B5EF4-FFF2-40B4-BE49-F238E27FC236}">
+                <a16:creationId xmlns:a16="http://schemas.microsoft.com/office/drawing/2014/main" id="{D23BB9F0-1B4B-4C2A-BF57-8BE1FA87E0D5}"/>
+              </a:ext>
+            </a:extLst>
+          </p:cNvPr>
+          <p:cNvSpPr txBox="1"/>
+          <p:nvPr/>
+        </p:nvSpPr>
+        <p:spPr>
+          <a:xfrm>
+            <a:off x="7660314" y="1656574"/>
+            <a:ext cx="870623" cy="400110"/>
+          </a:xfrm>
+          <a:prstGeom prst="rect">
+            <a:avLst/>
+          </a:prstGeom>
+          <a:noFill/>
+        </p:spPr>
+        <p:txBody>
           <a:bodyPr wrap="none" rtlCol="0">
             <a:spAutoFit/>
           </a:bodyPr>
-          <a:lstStyle/>
-          <a:p>
-            <a:r>
-              <a:rPr lang="de-DE" sz="3600" b="1" dirty="0" smtClean="0">
+          <a:lstStyle>
+            <a:defPPr>
+              <a:defRPr lang="en-US"/>
+            </a:defPPr>
+            <a:lvl1pPr marL="0" algn="l" defTabSz="914400" rtl="0" eaLnBrk="1" latinLnBrk="0" hangingPunct="1">
+              <a:defRPr sz="1800" kern="1200">
+                <a:solidFill>
+                  <a:schemeClr val="tx1"/>
+                </a:solidFill>
+                <a:latin typeface="+mn-lt"/>
+                <a:ea typeface="+mn-ea"/>
+                <a:cs typeface="+mn-cs"/>
+              </a:defRPr>
+            </a:lvl1pPr>
+            <a:lvl2pPr marL="457200" algn="l" defTabSz="914400" rtl="0" eaLnBrk="1" latinLnBrk="0" hangingPunct="1">
+              <a:defRPr sz="1800" kern="1200">
+                <a:solidFill>
+                  <a:schemeClr val="tx1"/>
+                </a:solidFill>
+                <a:latin typeface="+mn-lt"/>
+                <a:ea typeface="+mn-ea"/>
+                <a:cs typeface="+mn-cs"/>
+              </a:defRPr>
+            </a:lvl2pPr>
+            <a:lvl3pPr marL="914400" algn="l" defTabSz="914400" rtl="0" eaLnBrk="1" latinLnBrk="0" hangingPunct="1">
+              <a:defRPr sz="1800" kern="1200">
+                <a:solidFill>
+                  <a:schemeClr val="tx1"/>
+                </a:solidFill>
+                <a:latin typeface="+mn-lt"/>
+                <a:ea typeface="+mn-ea"/>
+                <a:cs typeface="+mn-cs"/>
+              </a:defRPr>
+            </a:lvl3pPr>
+            <a:lvl4pPr marL="1371600" algn="l" defTabSz="914400" rtl="0" eaLnBrk="1" latinLnBrk="0" hangingPunct="1">
+              <a:defRPr sz="1800" kern="1200">
+                <a:solidFill>
+                  <a:schemeClr val="tx1"/>
+                </a:solidFill>
+                <a:latin typeface="+mn-lt"/>
+                <a:ea typeface="+mn-ea"/>
+                <a:cs typeface="+mn-cs"/>
+              </a:defRPr>
+            </a:lvl4pPr>
+            <a:lvl5pPr marL="1828800" algn="l" defTabSz="914400" rtl="0" eaLnBrk="1" latinLnBrk="0" hangingPunct="1">
+              <a:defRPr sz="1800" kern="1200">
+                <a:solidFill>
+                  <a:schemeClr val="tx1"/>
+                </a:solidFill>
+                <a:latin typeface="+mn-lt"/>
+                <a:ea typeface="+mn-ea"/>
+                <a:cs typeface="+mn-cs"/>
+              </a:defRPr>
+            </a:lvl5pPr>
+            <a:lvl6pPr marL="2286000" algn="l" defTabSz="914400" rtl="0" eaLnBrk="1" latinLnBrk="0" hangingPunct="1">
+              <a:defRPr sz="1800" kern="1200">
+                <a:solidFill>
+                  <a:schemeClr val="tx1"/>
+                </a:solidFill>
+                <a:latin typeface="+mn-lt"/>
+                <a:ea typeface="+mn-ea"/>
+                <a:cs typeface="+mn-cs"/>
+              </a:defRPr>
+            </a:lvl6pPr>
+            <a:lvl7pPr marL="2743200" algn="l" defTabSz="914400" rtl="0" eaLnBrk="1" latinLnBrk="0" hangingPunct="1">
+              <a:defRPr sz="1800" kern="1200">
+                <a:solidFill>
+                  <a:schemeClr val="tx1"/>
+                </a:solidFill>
+                <a:latin typeface="+mn-lt"/>
+                <a:ea typeface="+mn-ea"/>
+                <a:cs typeface="+mn-cs"/>
+              </a:defRPr>
+            </a:lvl7pPr>
+            <a:lvl8pPr marL="3200400" algn="l" defTabSz="914400" rtl="0" eaLnBrk="1" latinLnBrk="0" hangingPunct="1">
+              <a:defRPr sz="1800" kern="1200">
+                <a:solidFill>
+                  <a:schemeClr val="tx1"/>
+                </a:solidFill>
+                <a:latin typeface="+mn-lt"/>
+                <a:ea typeface="+mn-ea"/>
+                <a:cs typeface="+mn-cs"/>
+              </a:defRPr>
+            </a:lvl8pPr>
+            <a:lvl9pPr marL="3657600" algn="l" defTabSz="914400" rtl="0" eaLnBrk="1" latinLnBrk="0" hangingPunct="1">
+              <a:defRPr sz="1800" kern="1200">
+                <a:solidFill>
+                  <a:schemeClr val="tx1"/>
+                </a:solidFill>
+                <a:latin typeface="+mn-lt"/>
+                <a:ea typeface="+mn-ea"/>
+                <a:cs typeface="+mn-cs"/>
+              </a:defRPr>
+            </a:lvl9pPr>
+          </a:lstStyle>
+          <a:p>
+            <a:r>
+              <a:rPr lang="de-DE" sz="2000" b="1">
                 <a:solidFill>
                   <a:srgbClr val="2BB381"/>
                 </a:solidFill>
                 <a:latin typeface="Mulish" pitchFamily="2" charset="0"/>
               </a:rPr>
-              <a:t>User</a:t>
-            </a:r>
-            <a:endParaRPr lang="en-US" sz="3600" b="1" dirty="0">
+              <a:t>Server</a:t>
+            </a:r>
+            <a:endParaRPr lang="en-US" sz="2000" b="1">
               <a:solidFill>
                 <a:srgbClr val="2BB381"/>
               </a:solidFill>
@@ -3946,42 +4367,445 @@
           </a:p>
         </p:txBody>
       </p:sp>
+      <p:sp>
+        <p:nvSpPr>
+          <p:cNvPr id="68" name="Textfeld 27">
+            <a:extLst>
+              <a:ext uri="{FF2B5EF4-FFF2-40B4-BE49-F238E27FC236}">
+                <a16:creationId xmlns:a16="http://schemas.microsoft.com/office/drawing/2014/main" id="{18974CDA-8CB6-491C-8FD9-BEA76E92E598}"/>
+              </a:ext>
+            </a:extLst>
+          </p:cNvPr>
+          <p:cNvSpPr txBox="1"/>
+          <p:nvPr/>
+        </p:nvSpPr>
+        <p:spPr>
+          <a:xfrm>
+            <a:off x="3599208" y="1656574"/>
+            <a:ext cx="799450" cy="400110"/>
+          </a:xfrm>
+          <a:prstGeom prst="rect">
+            <a:avLst/>
+          </a:prstGeom>
+          <a:noFill/>
+        </p:spPr>
+        <p:txBody>
+          <a:bodyPr wrap="none" rtlCol="0">
+            <a:spAutoFit/>
+          </a:bodyPr>
+          <a:lstStyle>
+            <a:defPPr>
+              <a:defRPr lang="en-US"/>
+            </a:defPPr>
+            <a:lvl1pPr marL="0" algn="l" defTabSz="914400" rtl="0" eaLnBrk="1" latinLnBrk="0" hangingPunct="1">
+              <a:defRPr sz="1800" kern="1200">
+                <a:solidFill>
+                  <a:schemeClr val="tx1"/>
+                </a:solidFill>
+                <a:latin typeface="+mn-lt"/>
+                <a:ea typeface="+mn-ea"/>
+                <a:cs typeface="+mn-cs"/>
+              </a:defRPr>
+            </a:lvl1pPr>
+            <a:lvl2pPr marL="457200" algn="l" defTabSz="914400" rtl="0" eaLnBrk="1" latinLnBrk="0" hangingPunct="1">
+              <a:defRPr sz="1800" kern="1200">
+                <a:solidFill>
+                  <a:schemeClr val="tx1"/>
+                </a:solidFill>
+                <a:latin typeface="+mn-lt"/>
+                <a:ea typeface="+mn-ea"/>
+                <a:cs typeface="+mn-cs"/>
+              </a:defRPr>
+            </a:lvl2pPr>
+            <a:lvl3pPr marL="914400" algn="l" defTabSz="914400" rtl="0" eaLnBrk="1" latinLnBrk="0" hangingPunct="1">
+              <a:defRPr sz="1800" kern="1200">
+                <a:solidFill>
+                  <a:schemeClr val="tx1"/>
+                </a:solidFill>
+                <a:latin typeface="+mn-lt"/>
+                <a:ea typeface="+mn-ea"/>
+                <a:cs typeface="+mn-cs"/>
+              </a:defRPr>
+            </a:lvl3pPr>
+            <a:lvl4pPr marL="1371600" algn="l" defTabSz="914400" rtl="0" eaLnBrk="1" latinLnBrk="0" hangingPunct="1">
+              <a:defRPr sz="1800" kern="1200">
+                <a:solidFill>
+                  <a:schemeClr val="tx1"/>
+                </a:solidFill>
+                <a:latin typeface="+mn-lt"/>
+                <a:ea typeface="+mn-ea"/>
+                <a:cs typeface="+mn-cs"/>
+              </a:defRPr>
+            </a:lvl4pPr>
+            <a:lvl5pPr marL="1828800" algn="l" defTabSz="914400" rtl="0" eaLnBrk="1" latinLnBrk="0" hangingPunct="1">
+              <a:defRPr sz="1800" kern="1200">
+                <a:solidFill>
+                  <a:schemeClr val="tx1"/>
+                </a:solidFill>
+                <a:latin typeface="+mn-lt"/>
+                <a:ea typeface="+mn-ea"/>
+                <a:cs typeface="+mn-cs"/>
+              </a:defRPr>
+            </a:lvl5pPr>
+            <a:lvl6pPr marL="2286000" algn="l" defTabSz="914400" rtl="0" eaLnBrk="1" latinLnBrk="0" hangingPunct="1">
+              <a:defRPr sz="1800" kern="1200">
+                <a:solidFill>
+                  <a:schemeClr val="tx1"/>
+                </a:solidFill>
+                <a:latin typeface="+mn-lt"/>
+                <a:ea typeface="+mn-ea"/>
+                <a:cs typeface="+mn-cs"/>
+              </a:defRPr>
+            </a:lvl6pPr>
+            <a:lvl7pPr marL="2743200" algn="l" defTabSz="914400" rtl="0" eaLnBrk="1" latinLnBrk="0" hangingPunct="1">
+              <a:defRPr sz="1800" kern="1200">
+                <a:solidFill>
+                  <a:schemeClr val="tx1"/>
+                </a:solidFill>
+                <a:latin typeface="+mn-lt"/>
+                <a:ea typeface="+mn-ea"/>
+                <a:cs typeface="+mn-cs"/>
+              </a:defRPr>
+            </a:lvl7pPr>
+            <a:lvl8pPr marL="3200400" algn="l" defTabSz="914400" rtl="0" eaLnBrk="1" latinLnBrk="0" hangingPunct="1">
+              <a:defRPr sz="1800" kern="1200">
+                <a:solidFill>
+                  <a:schemeClr val="tx1"/>
+                </a:solidFill>
+                <a:latin typeface="+mn-lt"/>
+                <a:ea typeface="+mn-ea"/>
+                <a:cs typeface="+mn-cs"/>
+              </a:defRPr>
+            </a:lvl8pPr>
+            <a:lvl9pPr marL="3657600" algn="l" defTabSz="914400" rtl="0" eaLnBrk="1" latinLnBrk="0" hangingPunct="1">
+              <a:defRPr sz="1800" kern="1200">
+                <a:solidFill>
+                  <a:schemeClr val="tx1"/>
+                </a:solidFill>
+                <a:latin typeface="+mn-lt"/>
+                <a:ea typeface="+mn-ea"/>
+                <a:cs typeface="+mn-cs"/>
+              </a:defRPr>
+            </a:lvl9pPr>
+          </a:lstStyle>
+          <a:p>
+            <a:r>
+              <a:rPr lang="de-DE" sz="2000" b="1">
+                <a:solidFill>
+                  <a:srgbClr val="2BB381"/>
+                </a:solidFill>
+                <a:latin typeface="Mulish" pitchFamily="2" charset="0"/>
+              </a:rPr>
+              <a:t>Client</a:t>
+            </a:r>
+            <a:endParaRPr lang="en-US" sz="2000" b="1">
+              <a:solidFill>
+                <a:srgbClr val="2BB381"/>
+              </a:solidFill>
+              <a:latin typeface="Mulish" pitchFamily="2" charset="0"/>
+            </a:endParaRPr>
+          </a:p>
+        </p:txBody>
+      </p:sp>
+      <p:pic>
+        <p:nvPicPr>
+          <p:cNvPr id="69" name="Grafik 68">
+            <a:extLst>
+              <a:ext uri="{FF2B5EF4-FFF2-40B4-BE49-F238E27FC236}">
+                <a16:creationId xmlns:a16="http://schemas.microsoft.com/office/drawing/2014/main" id="{AAA0F021-B4CF-423E-A27C-1977D1C9AB65}"/>
+              </a:ext>
+            </a:extLst>
+          </p:cNvPr>
+          <p:cNvPicPr>
+            <a:picLocks noChangeAspect="1"/>
+          </p:cNvPicPr>
+          <p:nvPr/>
+        </p:nvPicPr>
+        <p:blipFill>
+          <a:blip r:embed="rId10">
+            <a:extLst>
+              <a:ext uri="{28A0092B-C50C-407E-A947-70E740481C1C}">
+                <a14:useLocalDpi xmlns:a14="http://schemas.microsoft.com/office/drawing/2010/main" val="0"/>
+              </a:ext>
+            </a:extLst>
+          </a:blip>
+          <a:stretch>
+            <a:fillRect/>
+          </a:stretch>
+        </p:blipFill>
+        <p:spPr>
+          <a:xfrm>
+            <a:off x="886013" y="3365457"/>
+            <a:ext cx="914400" cy="914400"/>
+          </a:xfrm>
+          <a:prstGeom prst="rect">
+            <a:avLst/>
+          </a:prstGeom>
+          <a:effectLst>
+            <a:outerShdw blurRad="50800" dist="38100" dir="2700000" algn="tl" rotWithShape="0">
+              <a:prstClr val="black">
+                <a:alpha val="40000"/>
+              </a:prstClr>
+            </a:outerShdw>
+          </a:effectLst>
+        </p:spPr>
+      </p:pic>
+      <p:sp>
+        <p:nvSpPr>
+          <p:cNvPr id="70" name="Textfeld 35">
+            <a:extLst>
+              <a:ext uri="{FF2B5EF4-FFF2-40B4-BE49-F238E27FC236}">
+                <a16:creationId xmlns:a16="http://schemas.microsoft.com/office/drawing/2014/main" id="{5532501D-DAFD-4B2F-B13A-CF862533A1C3}"/>
+              </a:ext>
+            </a:extLst>
+          </p:cNvPr>
+          <p:cNvSpPr txBox="1"/>
+          <p:nvPr/>
+        </p:nvSpPr>
+        <p:spPr>
+          <a:xfrm>
+            <a:off x="1002399" y="1656574"/>
+            <a:ext cx="675185" cy="400110"/>
+          </a:xfrm>
+          <a:prstGeom prst="rect">
+            <a:avLst/>
+          </a:prstGeom>
+          <a:noFill/>
+        </p:spPr>
+        <p:txBody>
+          <a:bodyPr wrap="none" rtlCol="0">
+            <a:spAutoFit/>
+          </a:bodyPr>
+          <a:lstStyle>
+            <a:defPPr>
+              <a:defRPr lang="en-US"/>
+            </a:defPPr>
+            <a:lvl1pPr marL="0" algn="l" defTabSz="914400" rtl="0" eaLnBrk="1" latinLnBrk="0" hangingPunct="1">
+              <a:defRPr sz="1800" kern="1200">
+                <a:solidFill>
+                  <a:schemeClr val="tx1"/>
+                </a:solidFill>
+                <a:latin typeface="+mn-lt"/>
+                <a:ea typeface="+mn-ea"/>
+                <a:cs typeface="+mn-cs"/>
+              </a:defRPr>
+            </a:lvl1pPr>
+            <a:lvl2pPr marL="457200" algn="l" defTabSz="914400" rtl="0" eaLnBrk="1" latinLnBrk="0" hangingPunct="1">
+              <a:defRPr sz="1800" kern="1200">
+                <a:solidFill>
+                  <a:schemeClr val="tx1"/>
+                </a:solidFill>
+                <a:latin typeface="+mn-lt"/>
+                <a:ea typeface="+mn-ea"/>
+                <a:cs typeface="+mn-cs"/>
+              </a:defRPr>
+            </a:lvl2pPr>
+            <a:lvl3pPr marL="914400" algn="l" defTabSz="914400" rtl="0" eaLnBrk="1" latinLnBrk="0" hangingPunct="1">
+              <a:defRPr sz="1800" kern="1200">
+                <a:solidFill>
+                  <a:schemeClr val="tx1"/>
+                </a:solidFill>
+                <a:latin typeface="+mn-lt"/>
+                <a:ea typeface="+mn-ea"/>
+                <a:cs typeface="+mn-cs"/>
+              </a:defRPr>
+            </a:lvl3pPr>
+            <a:lvl4pPr marL="1371600" algn="l" defTabSz="914400" rtl="0" eaLnBrk="1" latinLnBrk="0" hangingPunct="1">
+              <a:defRPr sz="1800" kern="1200">
+                <a:solidFill>
+                  <a:schemeClr val="tx1"/>
+                </a:solidFill>
+                <a:latin typeface="+mn-lt"/>
+                <a:ea typeface="+mn-ea"/>
+                <a:cs typeface="+mn-cs"/>
+              </a:defRPr>
+            </a:lvl4pPr>
+            <a:lvl5pPr marL="1828800" algn="l" defTabSz="914400" rtl="0" eaLnBrk="1" latinLnBrk="0" hangingPunct="1">
+              <a:defRPr sz="1800" kern="1200">
+                <a:solidFill>
+                  <a:schemeClr val="tx1"/>
+                </a:solidFill>
+                <a:latin typeface="+mn-lt"/>
+                <a:ea typeface="+mn-ea"/>
+                <a:cs typeface="+mn-cs"/>
+              </a:defRPr>
+            </a:lvl5pPr>
+            <a:lvl6pPr marL="2286000" algn="l" defTabSz="914400" rtl="0" eaLnBrk="1" latinLnBrk="0" hangingPunct="1">
+              <a:defRPr sz="1800" kern="1200">
+                <a:solidFill>
+                  <a:schemeClr val="tx1"/>
+                </a:solidFill>
+                <a:latin typeface="+mn-lt"/>
+                <a:ea typeface="+mn-ea"/>
+                <a:cs typeface="+mn-cs"/>
+              </a:defRPr>
+            </a:lvl6pPr>
+            <a:lvl7pPr marL="2743200" algn="l" defTabSz="914400" rtl="0" eaLnBrk="1" latinLnBrk="0" hangingPunct="1">
+              <a:defRPr sz="1800" kern="1200">
+                <a:solidFill>
+                  <a:schemeClr val="tx1"/>
+                </a:solidFill>
+                <a:latin typeface="+mn-lt"/>
+                <a:ea typeface="+mn-ea"/>
+                <a:cs typeface="+mn-cs"/>
+              </a:defRPr>
+            </a:lvl7pPr>
+            <a:lvl8pPr marL="3200400" algn="l" defTabSz="914400" rtl="0" eaLnBrk="1" latinLnBrk="0" hangingPunct="1">
+              <a:defRPr sz="1800" kern="1200">
+                <a:solidFill>
+                  <a:schemeClr val="tx1"/>
+                </a:solidFill>
+                <a:latin typeface="+mn-lt"/>
+                <a:ea typeface="+mn-ea"/>
+                <a:cs typeface="+mn-cs"/>
+              </a:defRPr>
+            </a:lvl8pPr>
+            <a:lvl9pPr marL="3657600" algn="l" defTabSz="914400" rtl="0" eaLnBrk="1" latinLnBrk="0" hangingPunct="1">
+              <a:defRPr sz="1800" kern="1200">
+                <a:solidFill>
+                  <a:schemeClr val="tx1"/>
+                </a:solidFill>
+                <a:latin typeface="+mn-lt"/>
+                <a:ea typeface="+mn-ea"/>
+                <a:cs typeface="+mn-cs"/>
+              </a:defRPr>
+            </a:lvl9pPr>
+          </a:lstStyle>
+          <a:p>
+            <a:r>
+              <a:rPr lang="de-DE" sz="2000" b="1">
+                <a:solidFill>
+                  <a:srgbClr val="2BB381"/>
+                </a:solidFill>
+                <a:latin typeface="Mulish" pitchFamily="2" charset="0"/>
+              </a:rPr>
+              <a:t>User</a:t>
+            </a:r>
+            <a:endParaRPr lang="en-US" sz="2000" b="1">
+              <a:solidFill>
+                <a:srgbClr val="2BB381"/>
+              </a:solidFill>
+              <a:latin typeface="Mulish" pitchFamily="2" charset="0"/>
+            </a:endParaRPr>
+          </a:p>
+        </p:txBody>
+      </p:sp>
       <p:cxnSp>
         <p:nvCxnSpPr>
-          <p:cNvPr id="37" name="Gerade Verbindung mit Pfeil 36"/>
+          <p:cNvPr id="71" name="Gerade Verbindung mit Pfeil 70">
+            <a:extLst>
+              <a:ext uri="{FF2B5EF4-FFF2-40B4-BE49-F238E27FC236}">
+                <a16:creationId xmlns:a16="http://schemas.microsoft.com/office/drawing/2014/main" id="{17B7F13B-D961-4494-AACA-23430B4E774F}"/>
+              </a:ext>
+            </a:extLst>
+          </p:cNvPr>
           <p:cNvCxnSpPr/>
           <p:nvPr/>
         </p:nvCxnSpPr>
         <p:spPr>
           <a:xfrm>
-            <a:off x="1779744" y="3379633"/>
+            <a:off x="2070903" y="3850970"/>
             <a:ext cx="845421" cy="16971"/>
           </a:xfrm>
           <a:prstGeom prst="straightConnector1">
             <a:avLst/>
           </a:prstGeom>
-          <a:ln w="57150">
+          <a:noFill/>
+          <a:ln w="57150" cap="flat" cmpd="sng" algn="ctr">
             <a:solidFill>
               <a:srgbClr val="2BB381"/>
             </a:solidFill>
+            <a:prstDash val="solid"/>
+            <a:miter lim="800000"/>
             <a:headEnd type="triangle"/>
             <a:tailEnd type="triangle"/>
           </a:ln>
+          <a:effectLst>
+            <a:outerShdw blurRad="50800" dist="38100" dir="2700000" algn="tl" rotWithShape="0">
+              <a:prstClr val="black">
+                <a:alpha val="40000"/>
+              </a:prstClr>
+            </a:outerShdw>
+          </a:effectLst>
         </p:spPr>
-        <p:style>
-          <a:lnRef idx="1">
-            <a:schemeClr val="accent1"/>
-          </a:lnRef>
-          <a:fillRef idx="0">
-            <a:schemeClr val="accent1"/>
-          </a:fillRef>
-          <a:effectRef idx="0">
-            <a:schemeClr val="accent1"/>
-          </a:effectRef>
-          <a:fontRef idx="minor">
-            <a:schemeClr val="tx1"/>
-          </a:fontRef>
-        </p:style>
+      </p:cxnSp>
+      <p:pic>
+        <p:nvPicPr>
+          <p:cNvPr id="72" name="Grafik 71">
+            <a:extLst>
+              <a:ext uri="{FF2B5EF4-FFF2-40B4-BE49-F238E27FC236}">
+                <a16:creationId xmlns:a16="http://schemas.microsoft.com/office/drawing/2014/main" id="{A428E9C5-6DC1-4EE7-A01E-C5B54F13FB01}"/>
+              </a:ext>
+            </a:extLst>
+          </p:cNvPr>
+          <p:cNvPicPr>
+            <a:picLocks noChangeAspect="1"/>
+          </p:cNvPicPr>
+          <p:nvPr/>
+        </p:nvPicPr>
+        <p:blipFill>
+          <a:blip r:embed="rId11"/>
+          <a:stretch>
+            <a:fillRect/>
+          </a:stretch>
+        </p:blipFill>
+        <p:spPr>
+          <a:xfrm>
+            <a:off x="6026120" y="4050701"/>
+            <a:ext cx="1756423" cy="619855"/>
+          </a:xfrm>
+          <a:prstGeom prst="rect">
+            <a:avLst/>
+          </a:prstGeom>
+          <a:effectLst>
+            <a:outerShdw blurRad="50800" dist="38100" dir="2700000" algn="tl" rotWithShape="0">
+              <a:prstClr val="black">
+                <a:alpha val="40000"/>
+              </a:prstClr>
+            </a:outerShdw>
+          </a:effectLst>
+        </p:spPr>
+      </p:pic>
+      <p:cxnSp>
+        <p:nvCxnSpPr>
+          <p:cNvPr id="73" name="Gerade Verbindung mit Pfeil 72">
+            <a:extLst>
+              <a:ext uri="{FF2B5EF4-FFF2-40B4-BE49-F238E27FC236}">
+                <a16:creationId xmlns:a16="http://schemas.microsoft.com/office/drawing/2014/main" id="{FA78A1D3-0CF8-49B4-BC6C-E82EEE8F8365}"/>
+              </a:ext>
+            </a:extLst>
+          </p:cNvPr>
+          <p:cNvCxnSpPr>
+            <a:cxnSpLocks/>
+          </p:cNvCxnSpPr>
+          <p:nvPr/>
+        </p:nvCxnSpPr>
+        <p:spPr>
+          <a:xfrm>
+            <a:off x="7847664" y="3850970"/>
+            <a:ext cx="845421" cy="16971"/>
+          </a:xfrm>
+          <a:prstGeom prst="straightConnector1">
+            <a:avLst/>
+          </a:prstGeom>
+          <a:noFill/>
+          <a:ln w="57150" cap="flat" cmpd="sng" algn="ctr">
+            <a:solidFill>
+              <a:srgbClr val="2BB381"/>
+            </a:solidFill>
+            <a:prstDash val="solid"/>
+            <a:miter lim="800000"/>
+            <a:headEnd type="triangle"/>
+            <a:tailEnd type="triangle"/>
+          </a:ln>
+          <a:effectLst>
+            <a:outerShdw blurRad="50800" dist="38100" dir="2700000" algn="tl" rotWithShape="0">
+              <a:prstClr val="black">
+                <a:alpha val="40000"/>
+              </a:prstClr>
+            </a:outerShdw>
+          </a:effectLst>
+        </p:spPr>
       </p:cxnSp>
     </p:spTree>
     <p:extLst>

</xml_diff>